<commit_message>
Added some animations. New pages
</commit_message>
<xml_diff>
--- a/Storyboard-LeslieN-V0.1.pptx
+++ b/Storyboard-LeslieN-V0.1.pptx
@@ -126,14 +126,6 @@
     </p:ext>
   </p:extLst>
 </p:presentation>
-</file>
-
-<file path=ppt/revisionInfo.xml><?xml version="1.0" encoding="utf-8"?>
-<p1510:revInfo xmlns:a="http://schemas.openxmlformats.org/drawingml/2006/main" xmlns:r="http://schemas.openxmlformats.org/officeDocument/2006/relationships" xmlns:p1510="http://schemas.microsoft.com/office/powerpoint/2015/10/main">
-  <p1510:revLst>
-    <p1510:client id="{C69C3032-BBCA-4E6C-9428-DBFA1AA0F349}" v="19" dt="2019-04-10T00:23:02.366"/>
-  </p1510:revLst>
-</p1510:revInfo>
 </file>
 
 <file path=ppt/changesInfos/changesInfo1.xml><?xml version="1.0" encoding="utf-8"?>
@@ -622,6 +614,22 @@
             <ac:spMk id="26" creationId="{15BC1854-0758-4843-BF3D-8F535969EB1D}"/>
           </ac:spMkLst>
         </pc:spChg>
+      </pc:sldChg>
+    </pc:docChg>
+  </pc:docChgLst>
+  <pc:docChgLst>
+    <pc:chgData name="Nicholas Leslie" userId="0327ce11-4c98-4a51-b8ab-3f8dfb854d39" providerId="ADAL" clId="{E1E4FE26-B07F-4FDE-AA5C-BF275695B299}"/>
+    <pc:docChg chg="modSld">
+      <pc:chgData name="Nicholas Leslie" userId="0327ce11-4c98-4a51-b8ab-3f8dfb854d39" providerId="ADAL" clId="{E1E4FE26-B07F-4FDE-AA5C-BF275695B299}" dt="2019-05-15T00:39:50.587" v="0" actId="20577"/>
+      <pc:docMkLst>
+        <pc:docMk/>
+      </pc:docMkLst>
+      <pc:sldChg chg="modNotesTx">
+        <pc:chgData name="Nicholas Leslie" userId="0327ce11-4c98-4a51-b8ab-3f8dfb854d39" providerId="ADAL" clId="{E1E4FE26-B07F-4FDE-AA5C-BF275695B299}" dt="2019-05-15T00:39:50.587" v="0" actId="20577"/>
+        <pc:sldMkLst>
+          <pc:docMk/>
+          <pc:sldMk cId="3502225928" sldId="263"/>
+        </pc:sldMkLst>
       </pc:sldChg>
     </pc:docChg>
   </pc:docChgLst>
@@ -1421,7 +1429,7 @@
           <a:p>
             <a:fld id="{02D48BAD-BBB6-46FC-B4AB-0D49E56AD0D9}" type="datetimeFigureOut">
               <a:rPr lang="en-NZ" smtClean="0"/>
-              <a:t>10/04/2019</a:t>
+              <a:t>15/05/2019</a:t>
             </a:fld>
             <a:endParaRPr lang="en-NZ"/>
           </a:p>
@@ -2916,6 +2924,9 @@
             </a:r>
           </a:p>
           <a:p>
+            <a:endParaRPr lang="en-NZ"/>
+          </a:p>
+          <a:p>
             <a:endParaRPr lang="en-NZ" dirty="0"/>
           </a:p>
         </p:txBody>
@@ -3665,7 +3676,7 @@
           <a:p>
             <a:fld id="{4C6BEA94-9EFA-4F57-B221-A27464F23FA7}" type="datetimeFigureOut">
               <a:rPr lang="en-NZ" smtClean="0"/>
-              <a:t>10/04/2019</a:t>
+              <a:t>15/05/2019</a:t>
             </a:fld>
             <a:endParaRPr lang="en-NZ"/>
           </a:p>
@@ -3865,7 +3876,7 @@
           <a:p>
             <a:fld id="{4C6BEA94-9EFA-4F57-B221-A27464F23FA7}" type="datetimeFigureOut">
               <a:rPr lang="en-NZ" smtClean="0"/>
-              <a:t>10/04/2019</a:t>
+              <a:t>15/05/2019</a:t>
             </a:fld>
             <a:endParaRPr lang="en-NZ"/>
           </a:p>
@@ -4075,7 +4086,7 @@
           <a:p>
             <a:fld id="{4C6BEA94-9EFA-4F57-B221-A27464F23FA7}" type="datetimeFigureOut">
               <a:rPr lang="en-NZ" smtClean="0"/>
-              <a:t>10/04/2019</a:t>
+              <a:t>15/05/2019</a:t>
             </a:fld>
             <a:endParaRPr lang="en-NZ"/>
           </a:p>
@@ -4275,7 +4286,7 @@
           <a:p>
             <a:fld id="{4C6BEA94-9EFA-4F57-B221-A27464F23FA7}" type="datetimeFigureOut">
               <a:rPr lang="en-NZ" smtClean="0"/>
-              <a:t>10/04/2019</a:t>
+              <a:t>15/05/2019</a:t>
             </a:fld>
             <a:endParaRPr lang="en-NZ"/>
           </a:p>
@@ -4551,7 +4562,7 @@
           <a:p>
             <a:fld id="{4C6BEA94-9EFA-4F57-B221-A27464F23FA7}" type="datetimeFigureOut">
               <a:rPr lang="en-NZ" smtClean="0"/>
-              <a:t>10/04/2019</a:t>
+              <a:t>15/05/2019</a:t>
             </a:fld>
             <a:endParaRPr lang="en-NZ"/>
           </a:p>
@@ -4819,7 +4830,7 @@
           <a:p>
             <a:fld id="{4C6BEA94-9EFA-4F57-B221-A27464F23FA7}" type="datetimeFigureOut">
               <a:rPr lang="en-NZ" smtClean="0"/>
-              <a:t>10/04/2019</a:t>
+              <a:t>15/05/2019</a:t>
             </a:fld>
             <a:endParaRPr lang="en-NZ"/>
           </a:p>
@@ -5234,7 +5245,7 @@
           <a:p>
             <a:fld id="{4C6BEA94-9EFA-4F57-B221-A27464F23FA7}" type="datetimeFigureOut">
               <a:rPr lang="en-NZ" smtClean="0"/>
-              <a:t>10/04/2019</a:t>
+              <a:t>15/05/2019</a:t>
             </a:fld>
             <a:endParaRPr lang="en-NZ"/>
           </a:p>
@@ -5376,7 +5387,7 @@
           <a:p>
             <a:fld id="{4C6BEA94-9EFA-4F57-B221-A27464F23FA7}" type="datetimeFigureOut">
               <a:rPr lang="en-NZ" smtClean="0"/>
-              <a:t>10/04/2019</a:t>
+              <a:t>15/05/2019</a:t>
             </a:fld>
             <a:endParaRPr lang="en-NZ"/>
           </a:p>
@@ -5489,7 +5500,7 @@
           <a:p>
             <a:fld id="{4C6BEA94-9EFA-4F57-B221-A27464F23FA7}" type="datetimeFigureOut">
               <a:rPr lang="en-NZ" smtClean="0"/>
-              <a:t>10/04/2019</a:t>
+              <a:t>15/05/2019</a:t>
             </a:fld>
             <a:endParaRPr lang="en-NZ"/>
           </a:p>
@@ -5802,7 +5813,7 @@
           <a:p>
             <a:fld id="{4C6BEA94-9EFA-4F57-B221-A27464F23FA7}" type="datetimeFigureOut">
               <a:rPr lang="en-NZ" smtClean="0"/>
-              <a:t>10/04/2019</a:t>
+              <a:t>15/05/2019</a:t>
             </a:fld>
             <a:endParaRPr lang="en-NZ"/>
           </a:p>
@@ -6091,7 +6102,7 @@
           <a:p>
             <a:fld id="{4C6BEA94-9EFA-4F57-B221-A27464F23FA7}" type="datetimeFigureOut">
               <a:rPr lang="en-NZ" smtClean="0"/>
-              <a:t>10/04/2019</a:t>
+              <a:t>15/05/2019</a:t>
             </a:fld>
             <a:endParaRPr lang="en-NZ"/>
           </a:p>
@@ -6334,7 +6345,7 @@
           <a:p>
             <a:fld id="{4C6BEA94-9EFA-4F57-B221-A27464F23FA7}" type="datetimeFigureOut">
               <a:rPr lang="en-NZ" smtClean="0"/>
-              <a:t>10/04/2019</a:t>
+              <a:t>15/05/2019</a:t>
             </a:fld>
             <a:endParaRPr lang="en-NZ"/>
           </a:p>

</xml_diff>